<commit_message>
added the project presentation in pdf
</commit_message>
<xml_diff>
--- a/final_presentation.pptx
+++ b/final_presentation.pptx
@@ -13021,7 +13021,7 @@
         <p:spPr>
           <a:xfrm>
             <a:off x="589875" y="1853850"/>
-            <a:ext cx="6901432" cy="2674500"/>
+            <a:ext cx="6250602" cy="2674500"/>
           </a:xfrm>
           <a:prstGeom prst="rect">
             <a:avLst/>
@@ -13029,7 +13029,7 @@
         </p:spPr>
         <p:txBody>
           <a:bodyPr spcFirstLastPara="1" wrap="square" lIns="91425" tIns="91425" rIns="91425" bIns="91425" anchor="t" anchorCtr="0">
-            <a:normAutofit lnSpcReduction="10000"/>
+            <a:normAutofit fontScale="92500"/>
           </a:bodyPr>
           <a:lstStyle/>
           <a:p>

</xml_diff>